<commit_message>
adding updates to ppt and my notebook
</commit_message>
<xml_diff>
--- a/Jeopardy Powerpoint_Team13_Project1.pptx
+++ b/Jeopardy Powerpoint_Team13_Project1.pptx
@@ -5,7 +5,7 @@
     <p:sldMasterId id="2147483660" r:id="rId1"/>
   </p:sldMasterIdLst>
   <p:notesMasterIdLst>
-    <p:notesMasterId r:id="rId10"/>
+    <p:notesMasterId r:id="rId11"/>
   </p:notesMasterIdLst>
   <p:sldIdLst>
     <p:sldId id="256" r:id="rId2"/>
@@ -13,9 +13,10 @@
     <p:sldId id="314" r:id="rId4"/>
     <p:sldId id="315" r:id="rId5"/>
     <p:sldId id="317" r:id="rId6"/>
-    <p:sldId id="318" r:id="rId7"/>
+    <p:sldId id="320" r:id="rId7"/>
     <p:sldId id="319" r:id="rId8"/>
-    <p:sldId id="312" r:id="rId9"/>
+    <p:sldId id="318" r:id="rId9"/>
+    <p:sldId id="312" r:id="rId10"/>
   </p:sldIdLst>
   <p:sldSz cx="12192000" cy="6858000"/>
   <p:notesSz cx="6858000" cy="9144000"/>
@@ -122,6 +123,225 @@
 </p:presentation>
 </file>
 
+<file path=ppt/revisionInfo.xml><?xml version="1.0" encoding="utf-8"?>
+<p1510:revInfo xmlns:a="http://schemas.openxmlformats.org/drawingml/2006/main" xmlns:r="http://schemas.openxmlformats.org/officeDocument/2006/relationships" xmlns:p1510="http://schemas.microsoft.com/office/powerpoint/2015/10/main">
+  <p1510:revLst>
+    <p1510:client id="{11C4D7C1-422D-42EB-8E23-8277B3076227}" v="9" dt="2020-04-24T02:18:17.370"/>
+  </p1510:revLst>
+</p1510:revInfo>
+</file>
+
+<file path=ppt/changesInfos/changesInfo1.xml><?xml version="1.0" encoding="utf-8"?>
+<pc:chgInfo xmlns:a="http://schemas.openxmlformats.org/drawingml/2006/main" xmlns:r="http://schemas.openxmlformats.org/officeDocument/2006/relationships" xmlns:ac="http://schemas.microsoft.com/office/drawing/2013/main/command" xmlns:pc="http://schemas.microsoft.com/office/powerpoint/2013/main/command">
+  <pc:docChgLst>
+    <pc:chgData name="Jessica Schmitz" userId="d4c5d33d9f641bbc" providerId="LiveId" clId="{11C4D7C1-422D-42EB-8E23-8277B3076227}"/>
+    <pc:docChg chg="custSel addSld modSld sldOrd">
+      <pc:chgData name="Jessica Schmitz" userId="d4c5d33d9f641bbc" providerId="LiveId" clId="{11C4D7C1-422D-42EB-8E23-8277B3076227}" dt="2020-04-24T02:23:25.818" v="1067" actId="20577"/>
+      <pc:docMkLst>
+        <pc:docMk/>
+      </pc:docMkLst>
+      <pc:sldChg chg="addSp modSp mod">
+        <pc:chgData name="Jessica Schmitz" userId="d4c5d33d9f641bbc" providerId="LiveId" clId="{11C4D7C1-422D-42EB-8E23-8277B3076227}" dt="2020-04-24T02:23:25.818" v="1067" actId="20577"/>
+        <pc:sldMkLst>
+          <pc:docMk/>
+          <pc:sldMk cId="3238223911" sldId="318"/>
+        </pc:sldMkLst>
+        <pc:spChg chg="mod">
+          <ac:chgData name="Jessica Schmitz" userId="d4c5d33d9f641bbc" providerId="LiveId" clId="{11C4D7C1-422D-42EB-8E23-8277B3076227}" dt="2020-04-24T02:23:25.818" v="1067" actId="20577"/>
+          <ac:spMkLst>
+            <pc:docMk/>
+            <pc:sldMk cId="3238223911" sldId="318"/>
+            <ac:spMk id="2" creationId="{69AD3694-B095-4995-95F3-D6E6534DA4CF}"/>
+          </ac:spMkLst>
+        </pc:spChg>
+        <pc:spChg chg="mod">
+          <ac:chgData name="Jessica Schmitz" userId="d4c5d33d9f641bbc" providerId="LiveId" clId="{11C4D7C1-422D-42EB-8E23-8277B3076227}" dt="2020-04-24T01:44:45.766" v="141" actId="404"/>
+          <ac:spMkLst>
+            <pc:docMk/>
+            <pc:sldMk cId="3238223911" sldId="318"/>
+            <ac:spMk id="3" creationId="{A76EE4F1-F425-4E41-8861-EB2327940DD6}"/>
+          </ac:spMkLst>
+        </pc:spChg>
+        <pc:spChg chg="mod">
+          <ac:chgData name="Jessica Schmitz" userId="d4c5d33d9f641bbc" providerId="LiveId" clId="{11C4D7C1-422D-42EB-8E23-8277B3076227}" dt="2020-04-24T01:47:59.870" v="307" actId="255"/>
+          <ac:spMkLst>
+            <pc:docMk/>
+            <pc:sldMk cId="3238223911" sldId="318"/>
+            <ac:spMk id="4" creationId="{59ABD35B-1AC0-451C-9D86-85406B2AFFCA}"/>
+          </ac:spMkLst>
+        </pc:spChg>
+        <pc:picChg chg="add mod">
+          <ac:chgData name="Jessica Schmitz" userId="d4c5d33d9f641bbc" providerId="LiveId" clId="{11C4D7C1-422D-42EB-8E23-8277B3076227}" dt="2020-04-24T01:48:20.691" v="309" actId="1076"/>
+          <ac:picMkLst>
+            <pc:docMk/>
+            <pc:sldMk cId="3238223911" sldId="318"/>
+            <ac:picMk id="6" creationId="{222D01A7-5A7D-4451-9EBB-76C36D2D15A0}"/>
+          </ac:picMkLst>
+        </pc:picChg>
+      </pc:sldChg>
+      <pc:sldChg chg="addSp delSp modSp mod ord">
+        <pc:chgData name="Jessica Schmitz" userId="d4c5d33d9f641bbc" providerId="LiveId" clId="{11C4D7C1-422D-42EB-8E23-8277B3076227}" dt="2020-04-24T02:22:50.976" v="1005"/>
+        <pc:sldMkLst>
+          <pc:docMk/>
+          <pc:sldMk cId="3540525374" sldId="319"/>
+        </pc:sldMkLst>
+        <pc:spChg chg="mod">
+          <ac:chgData name="Jessica Schmitz" userId="d4c5d33d9f641bbc" providerId="LiveId" clId="{11C4D7C1-422D-42EB-8E23-8277B3076227}" dt="2020-04-24T01:50:22.597" v="330" actId="20577"/>
+          <ac:spMkLst>
+            <pc:docMk/>
+            <pc:sldMk cId="3540525374" sldId="319"/>
+            <ac:spMk id="2" creationId="{CA972A8A-4310-4C9A-B75C-B81C448F2A1B}"/>
+          </ac:spMkLst>
+        </pc:spChg>
+        <pc:picChg chg="add del mod">
+          <ac:chgData name="Jessica Schmitz" userId="d4c5d33d9f641bbc" providerId="LiveId" clId="{11C4D7C1-422D-42EB-8E23-8277B3076227}" dt="2020-04-24T01:50:48.845" v="341" actId="478"/>
+          <ac:picMkLst>
+            <pc:docMk/>
+            <pc:sldMk cId="3540525374" sldId="319"/>
+            <ac:picMk id="6" creationId="{2F6FA2ED-028E-4B0E-97EB-CBF8AE52C08B}"/>
+          </ac:picMkLst>
+        </pc:picChg>
+        <pc:picChg chg="add del mod">
+          <ac:chgData name="Jessica Schmitz" userId="d4c5d33d9f641bbc" providerId="LiveId" clId="{11C4D7C1-422D-42EB-8E23-8277B3076227}" dt="2020-04-24T01:50:48.005" v="340" actId="478"/>
+          <ac:picMkLst>
+            <pc:docMk/>
+            <pc:sldMk cId="3540525374" sldId="319"/>
+            <ac:picMk id="8" creationId="{BBE4F4A4-90CC-405D-994E-54078CE545B8}"/>
+          </ac:picMkLst>
+        </pc:picChg>
+        <pc:picChg chg="add del mod">
+          <ac:chgData name="Jessica Schmitz" userId="d4c5d33d9f641bbc" providerId="LiveId" clId="{11C4D7C1-422D-42EB-8E23-8277B3076227}" dt="2020-04-24T01:50:46.917" v="339" actId="478"/>
+          <ac:picMkLst>
+            <pc:docMk/>
+            <pc:sldMk cId="3540525374" sldId="319"/>
+            <ac:picMk id="10" creationId="{9EB4574B-4614-45A9-A845-A5B3E445F661}"/>
+          </ac:picMkLst>
+        </pc:picChg>
+        <pc:picChg chg="add del mod">
+          <ac:chgData name="Jessica Schmitz" userId="d4c5d33d9f641bbc" providerId="LiveId" clId="{11C4D7C1-422D-42EB-8E23-8277B3076227}" dt="2020-04-24T01:51:04.737" v="345" actId="478"/>
+          <ac:picMkLst>
+            <pc:docMk/>
+            <pc:sldMk cId="3540525374" sldId="319"/>
+            <ac:picMk id="12" creationId="{A17D59D4-A5D6-43D6-9BE3-E3482C5684D9}"/>
+          </ac:picMkLst>
+        </pc:picChg>
+        <pc:picChg chg="add del mod">
+          <ac:chgData name="Jessica Schmitz" userId="d4c5d33d9f641bbc" providerId="LiveId" clId="{11C4D7C1-422D-42EB-8E23-8277B3076227}" dt="2020-04-24T01:51:43.173" v="349" actId="478"/>
+          <ac:picMkLst>
+            <pc:docMk/>
+            <pc:sldMk cId="3540525374" sldId="319"/>
+            <ac:picMk id="14" creationId="{E6A823C3-DE80-4AF1-ABB7-4F7075F98C9B}"/>
+          </ac:picMkLst>
+        </pc:picChg>
+        <pc:picChg chg="add del mod">
+          <ac:chgData name="Jessica Schmitz" userId="d4c5d33d9f641bbc" providerId="LiveId" clId="{11C4D7C1-422D-42EB-8E23-8277B3076227}" dt="2020-04-24T02:05:30.049" v="387" actId="478"/>
+          <ac:picMkLst>
+            <pc:docMk/>
+            <pc:sldMk cId="3540525374" sldId="319"/>
+            <ac:picMk id="16" creationId="{EE681CB8-2F6B-4C71-8E64-6F391E438E81}"/>
+          </ac:picMkLst>
+        </pc:picChg>
+        <pc:picChg chg="add del mod">
+          <ac:chgData name="Jessica Schmitz" userId="d4c5d33d9f641bbc" providerId="LiveId" clId="{11C4D7C1-422D-42EB-8E23-8277B3076227}" dt="2020-04-24T02:05:28.922" v="385" actId="478"/>
+          <ac:picMkLst>
+            <pc:docMk/>
+            <pc:sldMk cId="3540525374" sldId="319"/>
+            <ac:picMk id="18" creationId="{53B03C03-8D17-43BD-9DAB-17B6242D63D1}"/>
+          </ac:picMkLst>
+        </pc:picChg>
+        <pc:picChg chg="add del mod">
+          <ac:chgData name="Jessica Schmitz" userId="d4c5d33d9f641bbc" providerId="LiveId" clId="{11C4D7C1-422D-42EB-8E23-8277B3076227}" dt="2020-04-24T02:05:29.489" v="386" actId="478"/>
+          <ac:picMkLst>
+            <pc:docMk/>
+            <pc:sldMk cId="3540525374" sldId="319"/>
+            <ac:picMk id="20" creationId="{47C142B6-0131-402C-8CAE-E24D633CB67D}"/>
+          </ac:picMkLst>
+        </pc:picChg>
+        <pc:picChg chg="add del mod">
+          <ac:chgData name="Jessica Schmitz" userId="d4c5d33d9f641bbc" providerId="LiveId" clId="{11C4D7C1-422D-42EB-8E23-8277B3076227}" dt="2020-04-24T02:07:44.281" v="397" actId="478"/>
+          <ac:picMkLst>
+            <pc:docMk/>
+            <pc:sldMk cId="3540525374" sldId="319"/>
+            <ac:picMk id="22" creationId="{0B8EB1F3-7CB0-4A15-9EA2-6E1FAF98EACF}"/>
+          </ac:picMkLst>
+        </pc:picChg>
+        <pc:picChg chg="add del mod">
+          <ac:chgData name="Jessica Schmitz" userId="d4c5d33d9f641bbc" providerId="LiveId" clId="{11C4D7C1-422D-42EB-8E23-8277B3076227}" dt="2020-04-24T02:07:44.281" v="397" actId="478"/>
+          <ac:picMkLst>
+            <pc:docMk/>
+            <pc:sldMk cId="3540525374" sldId="319"/>
+            <ac:picMk id="24" creationId="{58A252C6-B0F7-4814-B485-F8A2B4824BF9}"/>
+          </ac:picMkLst>
+        </pc:picChg>
+        <pc:picChg chg="add del mod">
+          <ac:chgData name="Jessica Schmitz" userId="d4c5d33d9f641bbc" providerId="LiveId" clId="{11C4D7C1-422D-42EB-8E23-8277B3076227}" dt="2020-04-24T02:07:44.281" v="397" actId="478"/>
+          <ac:picMkLst>
+            <pc:docMk/>
+            <pc:sldMk cId="3540525374" sldId="319"/>
+            <ac:picMk id="26" creationId="{DC82A3AD-46C0-4B42-AD73-3671F9511542}"/>
+          </ac:picMkLst>
+        </pc:picChg>
+        <pc:picChg chg="add mod">
+          <ac:chgData name="Jessica Schmitz" userId="d4c5d33d9f641bbc" providerId="LiveId" clId="{11C4D7C1-422D-42EB-8E23-8277B3076227}" dt="2020-04-24T02:08:44.308" v="415" actId="14100"/>
+          <ac:picMkLst>
+            <pc:docMk/>
+            <pc:sldMk cId="3540525374" sldId="319"/>
+            <ac:picMk id="28" creationId="{606EE8BE-0F04-4E84-A4FB-9DE81F79E67C}"/>
+          </ac:picMkLst>
+        </pc:picChg>
+        <pc:picChg chg="add mod">
+          <ac:chgData name="Jessica Schmitz" userId="d4c5d33d9f641bbc" providerId="LiveId" clId="{11C4D7C1-422D-42EB-8E23-8277B3076227}" dt="2020-04-24T02:08:41.987" v="414" actId="14100"/>
+          <ac:picMkLst>
+            <pc:docMk/>
+            <pc:sldMk cId="3540525374" sldId="319"/>
+            <ac:picMk id="30" creationId="{FD8A07FF-125D-4CD2-909A-A5D99EAEE6BB}"/>
+          </ac:picMkLst>
+        </pc:picChg>
+        <pc:picChg chg="add mod">
+          <ac:chgData name="Jessica Schmitz" userId="d4c5d33d9f641bbc" providerId="LiveId" clId="{11C4D7C1-422D-42EB-8E23-8277B3076227}" dt="2020-04-24T02:08:46.454" v="416" actId="14100"/>
+          <ac:picMkLst>
+            <pc:docMk/>
+            <pc:sldMk cId="3540525374" sldId="319"/>
+            <ac:picMk id="32" creationId="{AD837127-6CA0-41F8-BACB-8B456D944B9B}"/>
+          </ac:picMkLst>
+        </pc:picChg>
+      </pc:sldChg>
+      <pc:sldChg chg="addSp modSp new mod">
+        <pc:chgData name="Jessica Schmitz" userId="d4c5d33d9f641bbc" providerId="LiveId" clId="{11C4D7C1-422D-42EB-8E23-8277B3076227}" dt="2020-04-24T02:22:22.516" v="1002" actId="14100"/>
+        <pc:sldMkLst>
+          <pc:docMk/>
+          <pc:sldMk cId="4133804788" sldId="320"/>
+        </pc:sldMkLst>
+        <pc:spChg chg="mod">
+          <ac:chgData name="Jessica Schmitz" userId="d4c5d33d9f641bbc" providerId="LiveId" clId="{11C4D7C1-422D-42EB-8E23-8277B3076227}" dt="2020-04-24T02:22:09.505" v="1000" actId="20577"/>
+          <ac:spMkLst>
+            <pc:docMk/>
+            <pc:sldMk cId="4133804788" sldId="320"/>
+            <ac:spMk id="2" creationId="{74786F63-4335-4FD3-BD21-FC211F5CEFBD}"/>
+          </ac:spMkLst>
+        </pc:spChg>
+        <pc:spChg chg="mod">
+          <ac:chgData name="Jessica Schmitz" userId="d4c5d33d9f641bbc" providerId="LiveId" clId="{11C4D7C1-422D-42EB-8E23-8277B3076227}" dt="2020-04-24T02:18:07.961" v="500" actId="20577"/>
+          <ac:spMkLst>
+            <pc:docMk/>
+            <pc:sldMk cId="4133804788" sldId="320"/>
+            <ac:spMk id="3" creationId="{BC27C9D4-D83D-4033-8CF2-429348B4E7E7}"/>
+          </ac:spMkLst>
+        </pc:spChg>
+        <pc:picChg chg="add mod">
+          <ac:chgData name="Jessica Schmitz" userId="d4c5d33d9f641bbc" providerId="LiveId" clId="{11C4D7C1-422D-42EB-8E23-8277B3076227}" dt="2020-04-24T02:22:22.516" v="1002" actId="14100"/>
+          <ac:picMkLst>
+            <pc:docMk/>
+            <pc:sldMk cId="4133804788" sldId="320"/>
+            <ac:picMk id="5" creationId="{88505449-C97F-48B8-B89D-229FE8FB7366}"/>
+          </ac:picMkLst>
+        </pc:picChg>
+      </pc:sldChg>
+    </pc:docChg>
+  </pc:docChgLst>
+</pc:chgInfo>
+</file>
+
 <file path=ppt/notesMasters/notesMaster1.xml><?xml version="1.0" encoding="utf-8"?>
 <p:notesMaster xmlns:a="http://schemas.openxmlformats.org/drawingml/2006/main" xmlns:r="http://schemas.openxmlformats.org/officeDocument/2006/relationships" xmlns:p="http://schemas.openxmlformats.org/presentationml/2006/main">
   <p:cSld>
@@ -204,7 +424,7 @@
           <a:p>
             <a:fld id="{65BD7DC0-E519-47E8-83EB-70AC66B114EC}" type="datetimeFigureOut">
               <a:rPr lang="en-US" smtClean="0"/>
-              <a:t>4/21/2020</a:t>
+              <a:t>4/23/2020</a:t>
             </a:fld>
             <a:endParaRPr lang="en-US"/>
           </a:p>
@@ -5289,10 +5509,84 @@
       </p:grpSpPr>
       <p:sp>
         <p:nvSpPr>
-          <p:cNvPr id="2" name="Title 1">
+          <p:cNvPr id="2" name="Text Placeholder 1">
             <a:extLst>
               <a:ext uri="{FF2B5EF4-FFF2-40B4-BE49-F238E27FC236}">
-                <a16:creationId xmlns:a16="http://schemas.microsoft.com/office/drawing/2014/main" id="{69AD3694-B095-4995-95F3-D6E6534DA4CF}"/>
+                <a16:creationId xmlns:a16="http://schemas.microsoft.com/office/drawing/2014/main" id="{74786F63-4335-4FD3-BD21-FC211F5CEFBD}"/>
+              </a:ext>
+            </a:extLst>
+          </p:cNvPr>
+          <p:cNvSpPr>
+            <a:spLocks noGrp="1"/>
+          </p:cNvSpPr>
+          <p:nvPr>
+            <p:ph type="body" idx="1"/>
+          </p:nvPr>
+        </p:nvSpPr>
+        <p:spPr>
+          <a:xfrm>
+            <a:off x="609600" y="1658990"/>
+            <a:ext cx="5959878" cy="4840500"/>
+          </a:xfrm>
+        </p:spPr>
+        <p:txBody>
+          <a:bodyPr/>
+          <a:lstStyle/>
+          <a:p>
+            <a:r>
+              <a:rPr lang="en-US" sz="2800" dirty="0"/>
+              <a:t>Found the top 5 questions</a:t>
+            </a:r>
+          </a:p>
+          <a:p>
+            <a:pPr lvl="1"/>
+            <a:r>
+              <a:rPr lang="en-US" sz="2400" dirty="0"/>
+              <a:t>Australia: 327</a:t>
+            </a:r>
+          </a:p>
+          <a:p>
+            <a:pPr lvl="1"/>
+            <a:r>
+              <a:rPr lang="en-US" sz="2400" dirty="0"/>
+              <a:t>China: 322</a:t>
+            </a:r>
+          </a:p>
+          <a:p>
+            <a:pPr lvl="1"/>
+            <a:r>
+              <a:rPr lang="en-US" sz="2400" dirty="0"/>
+              <a:t>France: 310</a:t>
+            </a:r>
+          </a:p>
+          <a:p>
+            <a:pPr lvl="1"/>
+            <a:r>
+              <a:rPr lang="en-US" sz="2400" dirty="0"/>
+              <a:t>Japan: 308</a:t>
+            </a:r>
+          </a:p>
+          <a:p>
+            <a:pPr lvl="1"/>
+            <a:r>
+              <a:rPr lang="en-US" sz="2400" dirty="0"/>
+              <a:t>Chicago: 306</a:t>
+            </a:r>
+          </a:p>
+          <a:p>
+            <a:r>
+              <a:rPr lang="en-US" sz="2800" dirty="0"/>
+              <a:t>Although my data is limited to the top 5, you can expand the data out and this will help you understand which questions you should study the most. </a:t>
+            </a:r>
+          </a:p>
+        </p:txBody>
+      </p:sp>
+      <p:sp>
+        <p:nvSpPr>
+          <p:cNvPr id="3" name="Title 2">
+            <a:extLst>
+              <a:ext uri="{FF2B5EF4-FFF2-40B4-BE49-F238E27FC236}">
+                <a16:creationId xmlns:a16="http://schemas.microsoft.com/office/drawing/2014/main" id="{BC27C9D4-D83D-4033-8CF2-429348B4E7E7}"/>
               </a:ext>
             </a:extLst>
           </p:cNvPr>
@@ -5308,64 +5602,53 @@
           <a:bodyPr/>
           <a:lstStyle/>
           <a:p>
-            <a:endParaRPr lang="en-US"/>
+            <a:r>
+              <a:rPr lang="en-US" dirty="0"/>
+              <a:t>What are the top 5 questions on Jeopardy?</a:t>
+            </a:r>
           </a:p>
         </p:txBody>
       </p:sp>
-      <p:sp>
-        <p:nvSpPr>
-          <p:cNvPr id="3" name="Text Placeholder 2">
+      <p:pic>
+        <p:nvPicPr>
+          <p:cNvPr id="5" name="Picture 4" descr="A screenshot of a cell phone&#10;&#10;Description automatically generated">
             <a:extLst>
               <a:ext uri="{FF2B5EF4-FFF2-40B4-BE49-F238E27FC236}">
-                <a16:creationId xmlns:a16="http://schemas.microsoft.com/office/drawing/2014/main" id="{A76EE4F1-F425-4E41-8861-EB2327940DD6}"/>
+                <a16:creationId xmlns:a16="http://schemas.microsoft.com/office/drawing/2014/main" id="{88505449-C97F-48B8-B89D-229FE8FB7366}"/>
               </a:ext>
             </a:extLst>
           </p:cNvPr>
-          <p:cNvSpPr>
-            <a:spLocks noGrp="1"/>
-          </p:cNvSpPr>
-          <p:nvPr>
-            <p:ph type="body" idx="1"/>
-          </p:nvPr>
-        </p:nvSpPr>
-        <p:spPr/>
-        <p:txBody>
-          <a:bodyPr/>
-          <a:lstStyle/>
-          <a:p>
-            <a:endParaRPr lang="en-US"/>
-          </a:p>
-        </p:txBody>
-      </p:sp>
-      <p:sp>
-        <p:nvSpPr>
-          <p:cNvPr id="4" name="Text Placeholder 3">
+          <p:cNvPicPr>
+            <a:picLocks noChangeAspect="1"/>
+          </p:cNvPicPr>
+          <p:nvPr/>
+        </p:nvPicPr>
+        <p:blipFill>
+          <a:blip r:embed="rId2">
             <a:extLst>
-              <a:ext uri="{FF2B5EF4-FFF2-40B4-BE49-F238E27FC236}">
-                <a16:creationId xmlns:a16="http://schemas.microsoft.com/office/drawing/2014/main" id="{59ABD35B-1AC0-451C-9D86-85406B2AFFCA}"/>
+              <a:ext uri="{28A0092B-C50C-407E-A947-70E740481C1C}">
+                <a14:useLocalDpi xmlns:a14="http://schemas.microsoft.com/office/drawing/2010/main" val="0"/>
               </a:ext>
             </a:extLst>
-          </p:cNvPr>
-          <p:cNvSpPr>
-            <a:spLocks noGrp="1"/>
-          </p:cNvSpPr>
-          <p:nvPr>
-            <p:ph type="body" idx="2"/>
-          </p:nvPr>
-        </p:nvSpPr>
-        <p:spPr/>
-        <p:txBody>
-          <a:bodyPr/>
-          <a:lstStyle/>
-          <a:p>
-            <a:endParaRPr lang="en-US"/>
-          </a:p>
-        </p:txBody>
-      </p:sp>
+          </a:blip>
+          <a:stretch>
+            <a:fillRect/>
+          </a:stretch>
+        </p:blipFill>
+        <p:spPr>
+          <a:xfrm>
+            <a:off x="6569478" y="1658989"/>
+            <a:ext cx="5397933" cy="4403305"/>
+          </a:xfrm>
+          <a:prstGeom prst="rect">
+            <a:avLst/>
+          </a:prstGeom>
+        </p:spPr>
+      </p:pic>
     </p:spTree>
     <p:extLst>
       <p:ext uri="{BB962C8B-B14F-4D97-AF65-F5344CB8AC3E}">
-        <p14:creationId xmlns:p14="http://schemas.microsoft.com/office/powerpoint/2010/main" val="3238223911"/>
+        <p14:creationId xmlns:p14="http://schemas.microsoft.com/office/powerpoint/2010/main" val="4133804788"/>
       </p:ext>
     </p:extLst>
   </p:cSld>
@@ -5413,7 +5696,10 @@
           <a:bodyPr/>
           <a:lstStyle/>
           <a:p>
-            <a:endParaRPr lang="en-US"/>
+            <a:r>
+              <a:rPr lang="en-US" dirty="0"/>
+              <a:t>Looking at the top 5 questions, which have the highest value?</a:t>
+            </a:r>
           </a:p>
         </p:txBody>
       </p:sp>
@@ -5438,7 +5724,7 @@
           <a:bodyPr/>
           <a:lstStyle/>
           <a:p>
-            <a:endParaRPr lang="en-US"/>
+            <a:endParaRPr lang="en-US" dirty="0"/>
           </a:p>
         </p:txBody>
       </p:sp>
@@ -5463,10 +5749,118 @@
           <a:bodyPr/>
           <a:lstStyle/>
           <a:p>
-            <a:endParaRPr lang="en-US"/>
+            <a:endParaRPr lang="en-US" dirty="0"/>
           </a:p>
         </p:txBody>
       </p:sp>
+      <p:pic>
+        <p:nvPicPr>
+          <p:cNvPr id="28" name="Picture 27" descr="A picture containing drawing&#10;&#10;Description automatically generated">
+            <a:extLst>
+              <a:ext uri="{FF2B5EF4-FFF2-40B4-BE49-F238E27FC236}">
+                <a16:creationId xmlns:a16="http://schemas.microsoft.com/office/drawing/2014/main" id="{606EE8BE-0F04-4E84-A4FB-9DE81F79E67C}"/>
+              </a:ext>
+            </a:extLst>
+          </p:cNvPr>
+          <p:cNvPicPr>
+            <a:picLocks noChangeAspect="1"/>
+          </p:cNvPicPr>
+          <p:nvPr/>
+        </p:nvPicPr>
+        <p:blipFill>
+          <a:blip r:embed="rId2">
+            <a:extLst>
+              <a:ext uri="{28A0092B-C50C-407E-A947-70E740481C1C}">
+                <a14:useLocalDpi xmlns:a14="http://schemas.microsoft.com/office/drawing/2010/main" val="0"/>
+              </a:ext>
+            </a:extLst>
+          </a:blip>
+          <a:stretch>
+            <a:fillRect/>
+          </a:stretch>
+        </p:blipFill>
+        <p:spPr>
+          <a:xfrm>
+            <a:off x="4549391" y="1767273"/>
+            <a:ext cx="3296417" cy="3189737"/>
+          </a:xfrm>
+          <a:prstGeom prst="rect">
+            <a:avLst/>
+          </a:prstGeom>
+        </p:spPr>
+      </p:pic>
+      <p:pic>
+        <p:nvPicPr>
+          <p:cNvPr id="30" name="Picture 29" descr="A picture containing screenshot, drawing&#10;&#10;Description automatically generated">
+            <a:extLst>
+              <a:ext uri="{FF2B5EF4-FFF2-40B4-BE49-F238E27FC236}">
+                <a16:creationId xmlns:a16="http://schemas.microsoft.com/office/drawing/2014/main" id="{FD8A07FF-125D-4CD2-909A-A5D99EAEE6BB}"/>
+              </a:ext>
+            </a:extLst>
+          </p:cNvPr>
+          <p:cNvPicPr>
+            <a:picLocks noChangeAspect="1"/>
+          </p:cNvPicPr>
+          <p:nvPr/>
+        </p:nvPicPr>
+        <p:blipFill>
+          <a:blip r:embed="rId3">
+            <a:extLst>
+              <a:ext uri="{28A0092B-C50C-407E-A947-70E740481C1C}">
+                <a14:useLocalDpi xmlns:a14="http://schemas.microsoft.com/office/drawing/2010/main" val="0"/>
+              </a:ext>
+            </a:extLst>
+          </a:blip>
+          <a:stretch>
+            <a:fillRect/>
+          </a:stretch>
+        </p:blipFill>
+        <p:spPr>
+          <a:xfrm>
+            <a:off x="812290" y="1767274"/>
+            <a:ext cx="3471278" cy="3189737"/>
+          </a:xfrm>
+          <a:prstGeom prst="rect">
+            <a:avLst/>
+          </a:prstGeom>
+        </p:spPr>
+      </p:pic>
+      <p:pic>
+        <p:nvPicPr>
+          <p:cNvPr id="32" name="Picture 31" descr="A screenshot of a cell phone&#10;&#10;Description automatically generated">
+            <a:extLst>
+              <a:ext uri="{FF2B5EF4-FFF2-40B4-BE49-F238E27FC236}">
+                <a16:creationId xmlns:a16="http://schemas.microsoft.com/office/drawing/2014/main" id="{AD837127-6CA0-41F8-BACB-8B456D944B9B}"/>
+              </a:ext>
+            </a:extLst>
+          </p:cNvPr>
+          <p:cNvPicPr>
+            <a:picLocks noChangeAspect="1"/>
+          </p:cNvPicPr>
+          <p:nvPr/>
+        </p:nvPicPr>
+        <p:blipFill>
+          <a:blip r:embed="rId4">
+            <a:extLst>
+              <a:ext uri="{28A0092B-C50C-407E-A947-70E740481C1C}">
+                <a14:useLocalDpi xmlns:a14="http://schemas.microsoft.com/office/drawing/2010/main" val="0"/>
+              </a:ext>
+            </a:extLst>
+          </a:blip>
+          <a:stretch>
+            <a:fillRect/>
+          </a:stretch>
+        </p:blipFill>
+        <p:spPr>
+          <a:xfrm>
+            <a:off x="8219086" y="1726253"/>
+            <a:ext cx="3566513" cy="3230757"/>
+          </a:xfrm>
+          <a:prstGeom prst="rect">
+            <a:avLst/>
+          </a:prstGeom>
+        </p:spPr>
+      </p:pic>
     </p:spTree>
     <p:extLst>
       <p:ext uri="{BB962C8B-B14F-4D97-AF65-F5344CB8AC3E}">
@@ -5481,6 +5875,156 @@
 </file>
 
 <file path=ppt/slides/slide8.xml><?xml version="1.0" encoding="utf-8"?>
+<p:sld xmlns:a="http://schemas.openxmlformats.org/drawingml/2006/main" xmlns:r="http://schemas.openxmlformats.org/officeDocument/2006/relationships" xmlns:p="http://schemas.openxmlformats.org/presentationml/2006/main">
+  <p:cSld>
+    <p:spTree>
+      <p:nvGrpSpPr>
+        <p:cNvPr id="1" name=""/>
+        <p:cNvGrpSpPr/>
+        <p:nvPr/>
+      </p:nvGrpSpPr>
+      <p:grpSpPr>
+        <a:xfrm>
+          <a:off x="0" y="0"/>
+          <a:ext cx="0" cy="0"/>
+          <a:chOff x="0" y="0"/>
+          <a:chExt cx="0" cy="0"/>
+        </a:xfrm>
+      </p:grpSpPr>
+      <p:sp>
+        <p:nvSpPr>
+          <p:cNvPr id="2" name="Title 1">
+            <a:extLst>
+              <a:ext uri="{FF2B5EF4-FFF2-40B4-BE49-F238E27FC236}">
+                <a16:creationId xmlns:a16="http://schemas.microsoft.com/office/drawing/2014/main" id="{69AD3694-B095-4995-95F3-D6E6534DA4CF}"/>
+              </a:ext>
+            </a:extLst>
+          </p:cNvPr>
+          <p:cNvSpPr>
+            <a:spLocks noGrp="1"/>
+          </p:cNvSpPr>
+          <p:nvPr>
+            <p:ph type="title"/>
+          </p:nvPr>
+        </p:nvSpPr>
+        <p:spPr/>
+        <p:txBody>
+          <a:bodyPr/>
+          <a:lstStyle/>
+          <a:p>
+            <a:r>
+              <a:rPr lang="en-US" dirty="0"/>
+              <a:t>How are the values of the top 5 questions distributed?  </a:t>
+            </a:r>
+          </a:p>
+        </p:txBody>
+      </p:sp>
+      <p:sp>
+        <p:nvSpPr>
+          <p:cNvPr id="3" name="Text Placeholder 2">
+            <a:extLst>
+              <a:ext uri="{FF2B5EF4-FFF2-40B4-BE49-F238E27FC236}">
+                <a16:creationId xmlns:a16="http://schemas.microsoft.com/office/drawing/2014/main" id="{A76EE4F1-F425-4E41-8861-EB2327940DD6}"/>
+              </a:ext>
+            </a:extLst>
+          </p:cNvPr>
+          <p:cNvSpPr>
+            <a:spLocks noGrp="1"/>
+          </p:cNvSpPr>
+          <p:nvPr>
+            <p:ph type="body" idx="1"/>
+          </p:nvPr>
+        </p:nvSpPr>
+        <p:spPr/>
+        <p:txBody>
+          <a:bodyPr/>
+          <a:lstStyle/>
+          <a:p>
+            <a:r>
+              <a:rPr lang="en-US" sz="2000" dirty="0"/>
+              <a:t>Looking at Density of Points Possible</a:t>
+            </a:r>
+          </a:p>
+        </p:txBody>
+      </p:sp>
+      <p:sp>
+        <p:nvSpPr>
+          <p:cNvPr id="4" name="Text Placeholder 3">
+            <a:extLst>
+              <a:ext uri="{FF2B5EF4-FFF2-40B4-BE49-F238E27FC236}">
+                <a16:creationId xmlns:a16="http://schemas.microsoft.com/office/drawing/2014/main" id="{59ABD35B-1AC0-451C-9D86-85406B2AFFCA}"/>
+              </a:ext>
+            </a:extLst>
+          </p:cNvPr>
+          <p:cNvSpPr>
+            <a:spLocks noGrp="1"/>
+          </p:cNvSpPr>
+          <p:nvPr>
+            <p:ph type="body" idx="2"/>
+          </p:nvPr>
+        </p:nvSpPr>
+        <p:spPr/>
+        <p:txBody>
+          <a:bodyPr/>
+          <a:lstStyle/>
+          <a:p>
+            <a:r>
+              <a:rPr lang="en-US" sz="2000" dirty="0"/>
+              <a:t>Looking at Frequency of Points Possible</a:t>
+            </a:r>
+          </a:p>
+        </p:txBody>
+      </p:sp>
+      <p:pic>
+        <p:nvPicPr>
+          <p:cNvPr id="6" name="Picture 5" descr="A screenshot of a cell phone&#10;&#10;Description automatically generated">
+            <a:extLst>
+              <a:ext uri="{FF2B5EF4-FFF2-40B4-BE49-F238E27FC236}">
+                <a16:creationId xmlns:a16="http://schemas.microsoft.com/office/drawing/2014/main" id="{222D01A7-5A7D-4451-9EBB-76C36D2D15A0}"/>
+              </a:ext>
+            </a:extLst>
+          </p:cNvPr>
+          <p:cNvPicPr>
+            <a:picLocks noChangeAspect="1"/>
+          </p:cNvPicPr>
+          <p:nvPr/>
+        </p:nvPicPr>
+        <p:blipFill>
+          <a:blip r:embed="rId2">
+            <a:extLst>
+              <a:ext uri="{28A0092B-C50C-407E-A947-70E740481C1C}">
+                <a14:useLocalDpi xmlns:a14="http://schemas.microsoft.com/office/drawing/2010/main" val="0"/>
+              </a:ext>
+            </a:extLst>
+          </a:blip>
+          <a:stretch>
+            <a:fillRect/>
+          </a:stretch>
+        </p:blipFill>
+        <p:spPr>
+          <a:xfrm>
+            <a:off x="609600" y="2245384"/>
+            <a:ext cx="11003133" cy="3667711"/>
+          </a:xfrm>
+          <a:prstGeom prst="rect">
+            <a:avLst/>
+          </a:prstGeom>
+        </p:spPr>
+      </p:pic>
+    </p:spTree>
+    <p:extLst>
+      <p:ext uri="{BB962C8B-B14F-4D97-AF65-F5344CB8AC3E}">
+        <p14:creationId xmlns:p14="http://schemas.microsoft.com/office/powerpoint/2010/main" val="3238223911"/>
+      </p:ext>
+    </p:extLst>
+  </p:cSld>
+  <p:clrMapOvr>
+    <a:masterClrMapping/>
+  </p:clrMapOvr>
+</p:sld>
+</file>
+
+<file path=ppt/slides/slide9.xml><?xml version="1.0" encoding="utf-8"?>
 <p:sld xmlns:a="http://schemas.openxmlformats.org/drawingml/2006/main" xmlns:r="http://schemas.openxmlformats.org/officeDocument/2006/relationships" xmlns:p="http://schemas.openxmlformats.org/presentationml/2006/main">
   <p:cSld>
     <p:bg>

</xml_diff>